<commit_message>
Add future prospects, Fix a strong message
</commit_message>
<xml_diff>
--- a/slide.pptx
+++ b/slide.pptx
@@ -5,7 +5,7 @@
     <p:sldMasterId id="2147483660" r:id="rId1"/>
   </p:sldMasterIdLst>
   <p:notesMasterIdLst>
-    <p:notesMasterId r:id="rId27"/>
+    <p:notesMasterId r:id="rId28"/>
   </p:notesMasterIdLst>
   <p:sldIdLst>
     <p:sldId id="256" r:id="rId2"/>
@@ -33,6 +33,7 @@
     <p:sldId id="278" r:id="rId24"/>
     <p:sldId id="279" r:id="rId25"/>
     <p:sldId id="280" r:id="rId26"/>
+    <p:sldId id="281" r:id="rId27"/>
   </p:sldIdLst>
   <p:sldSz cx="9144000" cy="6858000" type="screen4x3"/>
   <p:notesSz cx="6858000" cy="9144000"/>
@@ -4535,6 +4536,13 @@
   <p:clrMapOvr>
     <a:masterClrMapping/>
   </p:clrMapOvr>
+  <p:timing>
+    <p:tnLst>
+      <p:par>
+        <p:cTn id="1" dur="indefinite" restart="never" nodeType="tmRoot"/>
+      </p:par>
+    </p:tnLst>
+  </p:timing>
 </p:sld>
 </file>
 
@@ -5114,6 +5122,13 @@
   <p:clrMapOvr>
     <a:masterClrMapping/>
   </p:clrMapOvr>
+  <p:timing>
+    <p:tnLst>
+      <p:par>
+        <p:cTn id="1" dur="indefinite" restart="never" nodeType="tmRoot"/>
+      </p:par>
+    </p:tnLst>
+  </p:timing>
 </p:sld>
 </file>
 
@@ -5242,6 +5257,13 @@
   <p:clrMapOvr>
     <a:masterClrMapping/>
   </p:clrMapOvr>
+  <p:timing>
+    <p:tnLst>
+      <p:par>
+        <p:cTn id="1" dur="indefinite" restart="never" nodeType="tmRoot"/>
+      </p:par>
+    </p:tnLst>
+  </p:timing>
 </p:sld>
 </file>
 
@@ -5370,6 +5392,13 @@
   <p:clrMapOvr>
     <a:masterClrMapping/>
   </p:clrMapOvr>
+  <p:timing>
+    <p:tnLst>
+      <p:par>
+        <p:cTn id="1" dur="indefinite" restart="never" nodeType="tmRoot"/>
+      </p:par>
+    </p:tnLst>
+  </p:timing>
 </p:sld>
 </file>
 
@@ -5506,7 +5535,7 @@
                 <a:ea typeface="Hiragino Sans W3" charset="-128"/>
                 <a:cs typeface="Hiragino Sans W3" charset="-128"/>
               </a:rPr>
-              <a:t>教員のほうが使いこなせない</a:t>
+              <a:t>教師のほうが使いこなせない</a:t>
             </a:r>
             <a:endParaRPr kumimoji="1" lang="ja-JP" altLang="en-US" sz="3200" dirty="0">
               <a:solidFill>
@@ -5579,6 +5608,13 @@
   <p:clrMapOvr>
     <a:masterClrMapping/>
   </p:clrMapOvr>
+  <p:timing>
+    <p:tnLst>
+      <p:par>
+        <p:cTn id="1" dur="indefinite" restart="never" nodeType="tmRoot"/>
+      </p:par>
+    </p:tnLst>
+  </p:timing>
 </p:sld>
 </file>
 
@@ -5707,6 +5743,13 @@
   <p:clrMapOvr>
     <a:masterClrMapping/>
   </p:clrMapOvr>
+  <p:timing>
+    <p:tnLst>
+      <p:par>
+        <p:cTn id="1" dur="indefinite" restart="never" nodeType="tmRoot"/>
+      </p:par>
+    </p:tnLst>
+  </p:timing>
 </p:sld>
 </file>
 
@@ -5820,6 +5863,13 @@
   <p:clrMapOvr>
     <a:masterClrMapping/>
   </p:clrMapOvr>
+  <p:timing>
+    <p:tnLst>
+      <p:par>
+        <p:cTn id="1" dur="indefinite" restart="never" nodeType="tmRoot"/>
+      </p:par>
+    </p:tnLst>
+  </p:timing>
 </p:sld>
 </file>
 
@@ -5932,6 +5982,13 @@
   <p:clrMapOvr>
     <a:masterClrMapping/>
   </p:clrMapOvr>
+  <p:timing>
+    <p:tnLst>
+      <p:par>
+        <p:cTn id="1" dur="indefinite" restart="never" nodeType="tmRoot"/>
+      </p:par>
+    </p:tnLst>
+  </p:timing>
 </p:sld>
 </file>
 
@@ -6044,6 +6101,13 @@
   <p:clrMapOvr>
     <a:masterClrMapping/>
   </p:clrMapOvr>
+  <p:timing>
+    <p:tnLst>
+      <p:par>
+        <p:cTn id="1" dur="indefinite" restart="never" nodeType="tmRoot"/>
+      </p:par>
+    </p:tnLst>
+  </p:timing>
 </p:sld>
 </file>
 
@@ -6304,6 +6368,13 @@
   <p:clrMapOvr>
     <a:masterClrMapping/>
   </p:clrMapOvr>
+  <p:timing>
+    <p:tnLst>
+      <p:par>
+        <p:cTn id="1" dur="indefinite" restart="never" nodeType="tmRoot"/>
+      </p:par>
+    </p:tnLst>
+  </p:timing>
 </p:sld>
 </file>
 
@@ -6440,6 +6511,32 @@
             <a:r>
               <a:rPr lang="ja-JP" altLang="en-US" dirty="0" smtClean="0"/>
               <a:t>コンセプト</a:t>
+            </a:r>
+            <a:endParaRPr lang="en-US" altLang="ja-JP" dirty="0" smtClean="0"/>
+          </a:p>
+          <a:p>
+            <a:pPr marL="514350" marR="0" lvl="0" indent="-514350" defTabSz="914400" eaLnBrk="1" fontAlgn="auto" latinLnBrk="0" hangingPunct="1">
+              <a:lnSpc>
+                <a:spcPct val="150000"/>
+              </a:lnSpc>
+              <a:spcBef>
+                <a:spcPts val="0"/>
+              </a:spcBef>
+              <a:spcAft>
+                <a:spcPts val="0"/>
+              </a:spcAft>
+              <a:buClr>
+                <a:srgbClr val="26A69B"/>
+              </a:buClr>
+              <a:buSzPct val="125000"/>
+              <a:buFont typeface="+mj-lt"/>
+              <a:buAutoNum type="arabicPeriod"/>
+              <a:tabLst/>
+              <a:defRPr/>
+            </a:pPr>
+            <a:r>
+              <a:rPr lang="ja-JP" altLang="en-US" dirty="0" smtClean="0"/>
+              <a:t>今後の展望</a:t>
             </a:r>
             <a:endParaRPr lang="en-US" altLang="ja-JP" dirty="0" smtClean="0"/>
           </a:p>
@@ -6617,6 +6714,13 @@
   <p:clrMapOvr>
     <a:masterClrMapping/>
   </p:clrMapOvr>
+  <p:timing>
+    <p:tnLst>
+      <p:par>
+        <p:cTn id="1" dur="indefinite" restart="never" nodeType="tmRoot"/>
+      </p:par>
+    </p:tnLst>
+  </p:timing>
 </p:sld>
 </file>
 
@@ -6860,6 +6964,13 @@
   <p:clrMapOvr>
     <a:masterClrMapping/>
   </p:clrMapOvr>
+  <p:timing>
+    <p:tnLst>
+      <p:par>
+        <p:cTn id="1" dur="indefinite" restart="never" nodeType="tmRoot"/>
+      </p:par>
+    </p:tnLst>
+  </p:timing>
 </p:sld>
 </file>
 
@@ -7317,6 +7428,13 @@
   <p:clrMapOvr>
     <a:masterClrMapping/>
   </p:clrMapOvr>
+  <p:timing>
+    <p:tnLst>
+      <p:par>
+        <p:cTn id="1" dur="indefinite" restart="never" nodeType="tmRoot"/>
+      </p:par>
+    </p:tnLst>
+  </p:timing>
 </p:sld>
 </file>
 
@@ -7774,6 +7892,13 @@
   <p:clrMapOvr>
     <a:masterClrMapping/>
   </p:clrMapOvr>
+  <p:timing>
+    <p:tnLst>
+      <p:par>
+        <p:cTn id="1" dur="indefinite" restart="never" nodeType="tmRoot"/>
+      </p:par>
+    </p:tnLst>
+  </p:timing>
 </p:sld>
 </file>
 
@@ -7931,6 +8056,13 @@
   <p:clrMapOvr>
     <a:masterClrMapping/>
   </p:clrMapOvr>
+  <p:timing>
+    <p:tnLst>
+      <p:par>
+        <p:cTn id="1" dur="indefinite" restart="never" nodeType="tmRoot"/>
+      </p:par>
+    </p:tnLst>
+  </p:timing>
 </p:sld>
 </file>
 
@@ -8131,6 +8263,654 @@
   <p:clrMapOvr>
     <a:masterClrMapping/>
   </p:clrMapOvr>
+  <p:timing>
+    <p:tnLst>
+      <p:par>
+        <p:cTn id="1" dur="indefinite" restart="never" nodeType="tmRoot"/>
+      </p:par>
+    </p:tnLst>
+  </p:timing>
+</p:sld>
+</file>
+
+<file path=ppt/slides/slide26.xml><?xml version="1.0" encoding="utf-8"?>
+<p:sld xmlns:a="http://schemas.openxmlformats.org/drawingml/2006/main" xmlns:r="http://schemas.openxmlformats.org/officeDocument/2006/relationships" xmlns:p="http://schemas.openxmlformats.org/presentationml/2006/main">
+  <p:cSld>
+    <p:spTree>
+      <p:nvGrpSpPr>
+        <p:cNvPr id="1" name=""/>
+        <p:cNvGrpSpPr/>
+        <p:nvPr/>
+      </p:nvGrpSpPr>
+      <p:grpSpPr>
+        <a:xfrm>
+          <a:off x="0" y="0"/>
+          <a:ext cx="0" cy="0"/>
+          <a:chOff x="0" y="0"/>
+          <a:chExt cx="0" cy="0"/>
+        </a:xfrm>
+      </p:grpSpPr>
+      <p:sp>
+        <p:nvSpPr>
+          <p:cNvPr id="2" name="タイトル 1"/>
+          <p:cNvSpPr>
+            <a:spLocks noGrp="1"/>
+          </p:cNvSpPr>
+          <p:nvPr>
+            <p:ph type="title"/>
+          </p:nvPr>
+        </p:nvSpPr>
+        <p:spPr/>
+        <p:txBody>
+          <a:bodyPr>
+            <a:normAutofit fontScale="90000"/>
+          </a:bodyPr>
+          <a:lstStyle/>
+          <a:p>
+            <a:r>
+              <a:rPr kumimoji="1" lang="ja-JP" altLang="en-US" dirty="0" smtClean="0"/>
+              <a:t>今後の展望</a:t>
+            </a:r>
+            <a:endParaRPr kumimoji="1" lang="ja-JP" altLang="en-US" dirty="0"/>
+          </a:p>
+        </p:txBody>
+      </p:sp>
+      <p:sp>
+        <p:nvSpPr>
+          <p:cNvPr id="4" name="スライド番号プレースホルダー 3"/>
+          <p:cNvSpPr>
+            <a:spLocks noGrp="1"/>
+          </p:cNvSpPr>
+          <p:nvPr>
+            <p:ph type="sldNum" sz="quarter" idx="12"/>
+          </p:nvPr>
+        </p:nvSpPr>
+        <p:spPr/>
+        <p:txBody>
+          <a:bodyPr/>
+          <a:lstStyle/>
+          <a:p>
+            <a:r>
+              <a:rPr lang="en-US" altLang="ja-JP" smtClean="0"/>
+              <a:t>#</a:t>
+            </a:r>
+            <a:fld id="{F281072A-F9EF-F645-A589-9593A608EAA6}" type="slidenum">
+              <a:rPr lang="en-US" altLang="ja-JP" smtClean="0"/>
+              <a:pPr/>
+              <a:t>26</a:t>
+            </a:fld>
+            <a:endParaRPr lang="ja-JP" altLang="en-US" dirty="0"/>
+          </a:p>
+        </p:txBody>
+      </p:sp>
+      <p:sp>
+        <p:nvSpPr>
+          <p:cNvPr id="9" name="テキスト ボックス 8"/>
+          <p:cNvSpPr txBox="1"/>
+          <p:nvPr/>
+        </p:nvSpPr>
+        <p:spPr>
+          <a:xfrm>
+            <a:off x="535891" y="1119333"/>
+            <a:ext cx="5188504" cy="584775"/>
+          </a:xfrm>
+          <a:prstGeom prst="rect">
+            <a:avLst/>
+          </a:prstGeom>
+          <a:noFill/>
+        </p:spPr>
+        <p:txBody>
+          <a:bodyPr wrap="square" rtlCol="0">
+            <a:spAutoFit/>
+          </a:bodyPr>
+          <a:lstStyle/>
+          <a:p>
+            <a:r>
+              <a:rPr kumimoji="1" lang="en-US" altLang="ja-JP" sz="3200" dirty="0" smtClean="0">
+                <a:solidFill>
+                  <a:srgbClr val="26A69A"/>
+                </a:solidFill>
+                <a:latin typeface="Hiragino Sans W3" charset="-128"/>
+                <a:ea typeface="Hiragino Sans W3" charset="-128"/>
+                <a:cs typeface="Hiragino Sans W3" charset="-128"/>
+              </a:rPr>
+              <a:t>Edutainment</a:t>
+            </a:r>
+            <a:r>
+              <a:rPr kumimoji="1" lang="ja-JP" altLang="en-US" sz="3200" dirty="0" smtClean="0">
+                <a:solidFill>
+                  <a:srgbClr val="26A69A"/>
+                </a:solidFill>
+                <a:latin typeface="Hiragino Sans W3" charset="-128"/>
+                <a:ea typeface="Hiragino Sans W3" charset="-128"/>
+                <a:cs typeface="Hiragino Sans W3" charset="-128"/>
+              </a:rPr>
+              <a:t>：教育＋娯楽</a:t>
+            </a:r>
+            <a:endParaRPr kumimoji="1" lang="ja-JP" altLang="en-US" sz="3200" dirty="0">
+              <a:solidFill>
+                <a:srgbClr val="26A69A"/>
+              </a:solidFill>
+              <a:latin typeface="Hiragino Sans W3" charset="-128"/>
+              <a:ea typeface="Hiragino Sans W3" charset="-128"/>
+              <a:cs typeface="Hiragino Sans W3" charset="-128"/>
+            </a:endParaRPr>
+          </a:p>
+        </p:txBody>
+      </p:sp>
+      <p:sp>
+        <p:nvSpPr>
+          <p:cNvPr id="10" name="角丸四角形 9"/>
+          <p:cNvSpPr/>
+          <p:nvPr/>
+        </p:nvSpPr>
+        <p:spPr>
+          <a:xfrm>
+            <a:off x="661151" y="1843043"/>
+            <a:ext cx="2508550" cy="619689"/>
+          </a:xfrm>
+          <a:prstGeom prst="roundRect">
+            <a:avLst>
+              <a:gd name="adj" fmla="val 9804"/>
+            </a:avLst>
+          </a:prstGeom>
+          <a:solidFill>
+            <a:srgbClr val="26A69B"/>
+          </a:solidFill>
+          <a:ln>
+            <a:noFill/>
+          </a:ln>
+        </p:spPr>
+        <p:style>
+          <a:lnRef idx="2">
+            <a:schemeClr val="accent1">
+              <a:shade val="50000"/>
+            </a:schemeClr>
+          </a:lnRef>
+          <a:fillRef idx="1">
+            <a:schemeClr val="accent1"/>
+          </a:fillRef>
+          <a:effectRef idx="0">
+            <a:schemeClr val="accent1"/>
+          </a:effectRef>
+          <a:fontRef idx="minor">
+            <a:schemeClr val="lt1"/>
+          </a:fontRef>
+        </p:style>
+        <p:txBody>
+          <a:bodyPr rtlCol="0" anchor="ctr"/>
+          <a:lstStyle/>
+          <a:p>
+            <a:pPr algn="ctr"/>
+            <a:r>
+              <a:rPr kumimoji="1" lang="ja-JP" altLang="en-US" sz="2400" dirty="0" smtClean="0">
+                <a:solidFill>
+                  <a:srgbClr val="ECEFF1"/>
+                </a:solidFill>
+                <a:latin typeface="Hiragino Sans W3" charset="-128"/>
+                <a:ea typeface="Hiragino Sans W3" charset="-128"/>
+                <a:cs typeface="Hiragino Sans W3" charset="-128"/>
+              </a:rPr>
+              <a:t>教員</a:t>
+            </a:r>
+            <a:endParaRPr kumimoji="1" lang="ja-JP" altLang="en-US" sz="2400" dirty="0">
+              <a:solidFill>
+                <a:srgbClr val="ECEFF1"/>
+              </a:solidFill>
+              <a:latin typeface="Hiragino Sans W3" charset="-128"/>
+              <a:ea typeface="Hiragino Sans W3" charset="-128"/>
+              <a:cs typeface="Hiragino Sans W3" charset="-128"/>
+            </a:endParaRPr>
+          </a:p>
+        </p:txBody>
+      </p:sp>
+      <p:sp>
+        <p:nvSpPr>
+          <p:cNvPr id="11" name="角丸四角形 10"/>
+          <p:cNvSpPr/>
+          <p:nvPr/>
+        </p:nvSpPr>
+        <p:spPr>
+          <a:xfrm>
+            <a:off x="661151" y="3800656"/>
+            <a:ext cx="2508550" cy="619689"/>
+          </a:xfrm>
+          <a:prstGeom prst="roundRect">
+            <a:avLst>
+              <a:gd name="adj" fmla="val 9804"/>
+            </a:avLst>
+          </a:prstGeom>
+          <a:solidFill>
+            <a:srgbClr val="26A69B"/>
+          </a:solidFill>
+          <a:ln>
+            <a:noFill/>
+          </a:ln>
+        </p:spPr>
+        <p:style>
+          <a:lnRef idx="2">
+            <a:schemeClr val="accent1">
+              <a:shade val="50000"/>
+            </a:schemeClr>
+          </a:lnRef>
+          <a:fillRef idx="1">
+            <a:schemeClr val="accent1"/>
+          </a:fillRef>
+          <a:effectRef idx="0">
+            <a:schemeClr val="accent1"/>
+          </a:effectRef>
+          <a:fontRef idx="minor">
+            <a:schemeClr val="lt1"/>
+          </a:fontRef>
+        </p:style>
+        <p:txBody>
+          <a:bodyPr rtlCol="0" anchor="ctr"/>
+          <a:lstStyle/>
+          <a:p>
+            <a:pPr algn="ctr"/>
+            <a:r>
+              <a:rPr lang="ja-JP" altLang="en-US" sz="2400" dirty="0" smtClean="0">
+                <a:solidFill>
+                  <a:srgbClr val="ECEFF1"/>
+                </a:solidFill>
+                <a:latin typeface="Hiragino Sans W3" charset="-128"/>
+                <a:ea typeface="Hiragino Sans W3" charset="-128"/>
+                <a:cs typeface="Hiragino Sans W3" charset="-128"/>
+              </a:rPr>
+              <a:t>生徒</a:t>
+            </a:r>
+            <a:endParaRPr kumimoji="1" lang="ja-JP" altLang="en-US" sz="2400" dirty="0">
+              <a:solidFill>
+                <a:srgbClr val="ECEFF1"/>
+              </a:solidFill>
+              <a:latin typeface="Hiragino Sans W3" charset="-128"/>
+              <a:ea typeface="Hiragino Sans W3" charset="-128"/>
+              <a:cs typeface="Hiragino Sans W3" charset="-128"/>
+            </a:endParaRPr>
+          </a:p>
+        </p:txBody>
+      </p:sp>
+      <p:sp>
+        <p:nvSpPr>
+          <p:cNvPr id="12" name="テキスト ボックス 11"/>
+          <p:cNvSpPr txBox="1"/>
+          <p:nvPr/>
+        </p:nvSpPr>
+        <p:spPr>
+          <a:xfrm>
+            <a:off x="661151" y="2496416"/>
+            <a:ext cx="8006860" cy="584775"/>
+          </a:xfrm>
+          <a:prstGeom prst="rect">
+            <a:avLst/>
+          </a:prstGeom>
+          <a:noFill/>
+        </p:spPr>
+        <p:txBody>
+          <a:bodyPr wrap="square" rtlCol="0">
+            <a:spAutoFit/>
+          </a:bodyPr>
+          <a:lstStyle/>
+          <a:p>
+            <a:r>
+              <a:rPr lang="ja-JP" altLang="en-US" sz="3200" dirty="0" smtClean="0">
+                <a:solidFill>
+                  <a:srgbClr val="607D8B"/>
+                </a:solidFill>
+                <a:latin typeface="Hiragino Sans W3" charset="-128"/>
+                <a:ea typeface="Hiragino Sans W3" charset="-128"/>
+                <a:cs typeface="Hiragino Sans W3" charset="-128"/>
+              </a:rPr>
+              <a:t>他者からの評価でモチベーション</a:t>
+            </a:r>
+            <a:r>
+              <a:rPr lang="en-US" altLang="ja-JP" sz="3200" dirty="0" smtClean="0">
+                <a:solidFill>
+                  <a:srgbClr val="607D8B"/>
+                </a:solidFill>
+                <a:latin typeface="Hiragino Sans W3" charset="-128"/>
+                <a:ea typeface="Hiragino Sans W3" charset="-128"/>
+                <a:cs typeface="Hiragino Sans W3" charset="-128"/>
+              </a:rPr>
+              <a:t>UP</a:t>
+            </a:r>
+            <a:endParaRPr kumimoji="1" lang="ja-JP" altLang="en-US" sz="3200" dirty="0">
+              <a:solidFill>
+                <a:srgbClr val="607D8B"/>
+              </a:solidFill>
+              <a:latin typeface="Hiragino Sans W3" charset="-128"/>
+              <a:ea typeface="Hiragino Sans W3" charset="-128"/>
+              <a:cs typeface="Hiragino Sans W3" charset="-128"/>
+            </a:endParaRPr>
+          </a:p>
+        </p:txBody>
+      </p:sp>
+      <p:sp>
+        <p:nvSpPr>
+          <p:cNvPr id="14" name="テキスト ボックス 13"/>
+          <p:cNvSpPr txBox="1"/>
+          <p:nvPr/>
+        </p:nvSpPr>
+        <p:spPr>
+          <a:xfrm>
+            <a:off x="1137140" y="3047507"/>
+            <a:ext cx="8006860" cy="553998"/>
+          </a:xfrm>
+          <a:prstGeom prst="rect">
+            <a:avLst/>
+          </a:prstGeom>
+          <a:noFill/>
+        </p:spPr>
+        <p:txBody>
+          <a:bodyPr wrap="square" rtlCol="0">
+            <a:spAutoFit/>
+          </a:bodyPr>
+          <a:lstStyle/>
+          <a:p>
+            <a:r>
+              <a:rPr lang="ja-JP" altLang="en-US" sz="3000" dirty="0" smtClean="0">
+                <a:solidFill>
+                  <a:srgbClr val="607D8B"/>
+                </a:solidFill>
+                <a:latin typeface="Hiragino Sans W3" charset="-128"/>
+                <a:ea typeface="Hiragino Sans W3" charset="-128"/>
+                <a:cs typeface="Hiragino Sans W3" charset="-128"/>
+              </a:rPr>
+              <a:t>試験に「いいね」をつけられる、</a:t>
+            </a:r>
+            <a:r>
+              <a:rPr lang="en-US" altLang="ja-JP" sz="3000" dirty="0" err="1" smtClean="0">
+                <a:solidFill>
+                  <a:srgbClr val="607D8B"/>
+                </a:solidFill>
+                <a:latin typeface="Hiragino Sans W3" charset="-128"/>
+                <a:ea typeface="Hiragino Sans W3" charset="-128"/>
+                <a:cs typeface="Hiragino Sans W3" charset="-128"/>
+              </a:rPr>
+              <a:t>etc</a:t>
+            </a:r>
+            <a:r>
+              <a:rPr lang="mr-IN" altLang="ja-JP" sz="3000" dirty="0" smtClean="0">
+                <a:solidFill>
+                  <a:srgbClr val="607D8B"/>
+                </a:solidFill>
+                <a:latin typeface="Hiragino Sans W3" charset="-128"/>
+                <a:ea typeface="Hiragino Sans W3" charset="-128"/>
+                <a:cs typeface="Hiragino Sans W3" charset="-128"/>
+              </a:rPr>
+              <a:t>…</a:t>
+            </a:r>
+            <a:endParaRPr kumimoji="1" lang="ja-JP" altLang="en-US" sz="3000" dirty="0">
+              <a:solidFill>
+                <a:srgbClr val="607D8B"/>
+              </a:solidFill>
+              <a:latin typeface="Hiragino Sans W3" charset="-128"/>
+              <a:ea typeface="Hiragino Sans W3" charset="-128"/>
+              <a:cs typeface="Hiragino Sans W3" charset="-128"/>
+            </a:endParaRPr>
+          </a:p>
+        </p:txBody>
+      </p:sp>
+      <p:sp>
+        <p:nvSpPr>
+          <p:cNvPr id="15" name="右矢印 14"/>
+          <p:cNvSpPr/>
+          <p:nvPr/>
+        </p:nvSpPr>
+        <p:spPr>
+          <a:xfrm>
+            <a:off x="725252" y="3154110"/>
+            <a:ext cx="367381" cy="350874"/>
+          </a:xfrm>
+          <a:prstGeom prst="rightArrow">
+            <a:avLst/>
+          </a:prstGeom>
+          <a:solidFill>
+            <a:srgbClr val="26A69B"/>
+          </a:solidFill>
+          <a:ln>
+            <a:noFill/>
+          </a:ln>
+        </p:spPr>
+        <p:style>
+          <a:lnRef idx="2">
+            <a:schemeClr val="accent1">
+              <a:shade val="50000"/>
+            </a:schemeClr>
+          </a:lnRef>
+          <a:fillRef idx="1">
+            <a:schemeClr val="accent1"/>
+          </a:fillRef>
+          <a:effectRef idx="0">
+            <a:schemeClr val="accent1"/>
+          </a:effectRef>
+          <a:fontRef idx="minor">
+            <a:schemeClr val="lt1"/>
+          </a:fontRef>
+        </p:style>
+        <p:txBody>
+          <a:bodyPr rtlCol="0" anchor="ctr"/>
+          <a:lstStyle/>
+          <a:p>
+            <a:pPr algn="ctr"/>
+            <a:endParaRPr kumimoji="1" lang="ja-JP" altLang="en-US">
+              <a:solidFill>
+                <a:schemeClr val="tx1"/>
+              </a:solidFill>
+            </a:endParaRPr>
+          </a:p>
+        </p:txBody>
+      </p:sp>
+      <p:sp>
+        <p:nvSpPr>
+          <p:cNvPr id="16" name="テキスト ボックス 15"/>
+          <p:cNvSpPr txBox="1"/>
+          <p:nvPr/>
+        </p:nvSpPr>
+        <p:spPr>
+          <a:xfrm>
+            <a:off x="661151" y="4529885"/>
+            <a:ext cx="8006860" cy="584775"/>
+          </a:xfrm>
+          <a:prstGeom prst="rect">
+            <a:avLst/>
+          </a:prstGeom>
+          <a:noFill/>
+        </p:spPr>
+        <p:txBody>
+          <a:bodyPr wrap="square" rtlCol="0">
+            <a:spAutoFit/>
+          </a:bodyPr>
+          <a:lstStyle/>
+          <a:p>
+            <a:r>
+              <a:rPr kumimoji="1" lang="ja-JP" altLang="en-US" sz="3200" dirty="0" smtClean="0">
+                <a:solidFill>
+                  <a:srgbClr val="607D8B"/>
+                </a:solidFill>
+                <a:latin typeface="Hiragino Sans W3" charset="-128"/>
+                <a:ea typeface="Hiragino Sans W3" charset="-128"/>
+                <a:cs typeface="Hiragino Sans W3" charset="-128"/>
+              </a:rPr>
+              <a:t>ゲーム感覚でモチベーション</a:t>
+            </a:r>
+            <a:r>
+              <a:rPr kumimoji="1" lang="en-US" altLang="ja-JP" sz="3200" dirty="0" smtClean="0">
+                <a:solidFill>
+                  <a:srgbClr val="607D8B"/>
+                </a:solidFill>
+                <a:latin typeface="Hiragino Sans W3" charset="-128"/>
+                <a:ea typeface="Hiragino Sans W3" charset="-128"/>
+                <a:cs typeface="Hiragino Sans W3" charset="-128"/>
+              </a:rPr>
+              <a:t>UP</a:t>
+            </a:r>
+            <a:endParaRPr kumimoji="1" lang="ja-JP" altLang="en-US" sz="3200" dirty="0">
+              <a:solidFill>
+                <a:srgbClr val="607D8B"/>
+              </a:solidFill>
+              <a:latin typeface="Hiragino Sans W3" charset="-128"/>
+              <a:ea typeface="Hiragino Sans W3" charset="-128"/>
+              <a:cs typeface="Hiragino Sans W3" charset="-128"/>
+            </a:endParaRPr>
+          </a:p>
+        </p:txBody>
+      </p:sp>
+      <p:sp>
+        <p:nvSpPr>
+          <p:cNvPr id="17" name="右矢印 16"/>
+          <p:cNvSpPr/>
+          <p:nvPr/>
+        </p:nvSpPr>
+        <p:spPr>
+          <a:xfrm>
+            <a:off x="733402" y="5224989"/>
+            <a:ext cx="367381" cy="350874"/>
+          </a:xfrm>
+          <a:prstGeom prst="rightArrow">
+            <a:avLst/>
+          </a:prstGeom>
+          <a:solidFill>
+            <a:srgbClr val="26A69B"/>
+          </a:solidFill>
+          <a:ln>
+            <a:noFill/>
+          </a:ln>
+        </p:spPr>
+        <p:style>
+          <a:lnRef idx="2">
+            <a:schemeClr val="accent1">
+              <a:shade val="50000"/>
+            </a:schemeClr>
+          </a:lnRef>
+          <a:fillRef idx="1">
+            <a:schemeClr val="accent1"/>
+          </a:fillRef>
+          <a:effectRef idx="0">
+            <a:schemeClr val="accent1"/>
+          </a:effectRef>
+          <a:fontRef idx="minor">
+            <a:schemeClr val="lt1"/>
+          </a:fontRef>
+        </p:style>
+        <p:txBody>
+          <a:bodyPr rtlCol="0" anchor="ctr"/>
+          <a:lstStyle/>
+          <a:p>
+            <a:pPr algn="ctr"/>
+            <a:endParaRPr kumimoji="1" lang="ja-JP" altLang="en-US">
+              <a:solidFill>
+                <a:schemeClr val="tx1"/>
+              </a:solidFill>
+            </a:endParaRPr>
+          </a:p>
+        </p:txBody>
+      </p:sp>
+      <p:sp>
+        <p:nvSpPr>
+          <p:cNvPr id="18" name="テキスト ボックス 17"/>
+          <p:cNvSpPr txBox="1"/>
+          <p:nvPr/>
+        </p:nvSpPr>
+        <p:spPr>
+          <a:xfrm>
+            <a:off x="1092633" y="5071726"/>
+            <a:ext cx="8006860" cy="553998"/>
+          </a:xfrm>
+          <a:prstGeom prst="rect">
+            <a:avLst/>
+          </a:prstGeom>
+          <a:noFill/>
+        </p:spPr>
+        <p:txBody>
+          <a:bodyPr wrap="square" rtlCol="0">
+            <a:spAutoFit/>
+          </a:bodyPr>
+          <a:lstStyle/>
+          <a:p>
+            <a:r>
+              <a:rPr kumimoji="1" lang="ja-JP" altLang="en-US" sz="3000" dirty="0" smtClean="0">
+                <a:solidFill>
+                  <a:srgbClr val="607D8B"/>
+                </a:solidFill>
+                <a:latin typeface="Hiragino Sans W3" charset="-128"/>
+                <a:ea typeface="Hiragino Sans W3" charset="-128"/>
+                <a:cs typeface="Hiragino Sans W3" charset="-128"/>
+              </a:rPr>
+              <a:t>正答数に応じたポイント獲得</a:t>
+            </a:r>
+            <a:endParaRPr kumimoji="1" lang="ja-JP" altLang="en-US" sz="3000" dirty="0">
+              <a:solidFill>
+                <a:srgbClr val="607D8B"/>
+              </a:solidFill>
+              <a:latin typeface="Hiragino Sans W3" charset="-128"/>
+              <a:ea typeface="Hiragino Sans W3" charset="-128"/>
+              <a:cs typeface="Hiragino Sans W3" charset="-128"/>
+            </a:endParaRPr>
+          </a:p>
+        </p:txBody>
+      </p:sp>
+      <p:sp>
+        <p:nvSpPr>
+          <p:cNvPr id="19" name="テキスト ボックス 18"/>
+          <p:cNvSpPr txBox="1"/>
+          <p:nvPr/>
+        </p:nvSpPr>
+        <p:spPr>
+          <a:xfrm>
+            <a:off x="1092633" y="5613567"/>
+            <a:ext cx="6435509" cy="553998"/>
+          </a:xfrm>
+          <a:prstGeom prst="rect">
+            <a:avLst/>
+          </a:prstGeom>
+          <a:noFill/>
+        </p:spPr>
+        <p:txBody>
+          <a:bodyPr wrap="square" rtlCol="0">
+            <a:spAutoFit/>
+          </a:bodyPr>
+          <a:lstStyle/>
+          <a:p>
+            <a:r>
+              <a:rPr kumimoji="1" lang="ja-JP" altLang="en-US" sz="3000" dirty="0" smtClean="0">
+                <a:solidFill>
+                  <a:srgbClr val="607D8B"/>
+                </a:solidFill>
+                <a:latin typeface="Hiragino Sans W3" charset="-128"/>
+                <a:ea typeface="Hiragino Sans W3" charset="-128"/>
+                <a:cs typeface="Hiragino Sans W3" charset="-128"/>
+              </a:rPr>
+              <a:t>ポイントを文具・教科書と交換可能</a:t>
+            </a:r>
+            <a:endParaRPr kumimoji="1" lang="ja-JP" altLang="en-US" sz="3000" dirty="0">
+              <a:solidFill>
+                <a:srgbClr val="607D8B"/>
+              </a:solidFill>
+              <a:latin typeface="Hiragino Sans W3" charset="-128"/>
+              <a:ea typeface="Hiragino Sans W3" charset="-128"/>
+              <a:cs typeface="Hiragino Sans W3" charset="-128"/>
+            </a:endParaRPr>
+          </a:p>
+        </p:txBody>
+      </p:sp>
+    </p:spTree>
+    <p:extLst>
+      <p:ext uri="{BB962C8B-B14F-4D97-AF65-F5344CB8AC3E}">
+        <p14:creationId xmlns:p14="http://schemas.microsoft.com/office/powerpoint/2010/main" val="2131322445"/>
+      </p:ext>
+    </p:extLst>
+  </p:cSld>
+  <p:clrMapOvr>
+    <a:masterClrMapping/>
+  </p:clrMapOvr>
+  <p:timing>
+    <p:tnLst>
+      <p:par>
+        <p:cTn id="1" dur="indefinite" restart="never" nodeType="tmRoot"/>
+      </p:par>
+    </p:tnLst>
+  </p:timing>
 </p:sld>
 </file>
 
@@ -8258,6 +9038,13 @@
   <p:clrMapOvr>
     <a:masterClrMapping/>
   </p:clrMapOvr>
+  <p:timing>
+    <p:tnLst>
+      <p:par>
+        <p:cTn id="1" dur="indefinite" restart="never" nodeType="tmRoot"/>
+      </p:par>
+    </p:tnLst>
+  </p:timing>
 </p:sld>
 </file>
 
@@ -8861,6 +9648,13 @@
   <p:clrMapOvr>
     <a:masterClrMapping/>
   </p:clrMapOvr>
+  <p:timing>
+    <p:tnLst>
+      <p:par>
+        <p:cTn id="1" dur="indefinite" restart="never" nodeType="tmRoot"/>
+      </p:par>
+    </p:tnLst>
+  </p:timing>
 </p:sld>
 </file>
 
@@ -8968,7 +9762,7 @@
           <a:lstStyle/>
           <a:p>
             <a:r>
-              <a:rPr lang="ja-JP" altLang="en-US" sz="3200" smtClean="0">
+              <a:rPr lang="ja-JP" altLang="en-US" sz="3200" dirty="0" smtClean="0">
                 <a:solidFill>
                   <a:srgbClr val="26A69A"/>
                 </a:solidFill>
@@ -8976,7 +9770,29 @@
                 <a:ea typeface="Hiragino Sans W3" charset="-128"/>
                 <a:cs typeface="Hiragino Sans W3" charset="-128"/>
               </a:rPr>
-              <a:t>クソガキが知ったようなことを偉そうに</a:t>
+              <a:t>若造</a:t>
+            </a:r>
+            <a:r>
+              <a:rPr lang="ja-JP" altLang="en-US" sz="3200" dirty="0" smtClean="0">
+                <a:solidFill>
+                  <a:srgbClr val="26A69A"/>
+                </a:solidFill>
+                <a:latin typeface="Hiragino Sans W3" charset="-128"/>
+                <a:ea typeface="Hiragino Sans W3" charset="-128"/>
+                <a:cs typeface="Hiragino Sans W3" charset="-128"/>
+              </a:rPr>
+              <a:t>が</a:t>
+            </a:r>
+            <a:r>
+              <a:rPr lang="ja-JP" altLang="en-US" sz="3200" dirty="0" smtClean="0">
+                <a:solidFill>
+                  <a:srgbClr val="26A69A"/>
+                </a:solidFill>
+                <a:latin typeface="Hiragino Sans W3" charset="-128"/>
+                <a:ea typeface="Hiragino Sans W3" charset="-128"/>
+                <a:cs typeface="Hiragino Sans W3" charset="-128"/>
+              </a:rPr>
+              <a:t>知ったようなことを偉そうに</a:t>
             </a:r>
             <a:endParaRPr kumimoji="1" lang="ja-JP" altLang="en-US" sz="3200" dirty="0">
               <a:solidFill>
@@ -8999,6 +9815,13 @@
   <p:clrMapOvr>
     <a:masterClrMapping/>
   </p:clrMapOvr>
+  <p:timing>
+    <p:tnLst>
+      <p:par>
+        <p:cTn id="1" dur="indefinite" restart="never" nodeType="tmRoot"/>
+      </p:par>
+    </p:tnLst>
+  </p:timing>
 </p:sld>
 </file>
 
@@ -9831,6 +10654,13 @@
   <p:clrMapOvr>
     <a:masterClrMapping/>
   </p:clrMapOvr>
+  <p:timing>
+    <p:tnLst>
+      <p:par>
+        <p:cTn id="1" dur="indefinite" restart="never" nodeType="tmRoot"/>
+      </p:par>
+    </p:tnLst>
+  </p:timing>
 </p:sld>
 </file>
 
@@ -10663,6 +11493,13 @@
   <p:clrMapOvr>
     <a:masterClrMapping/>
   </p:clrMapOvr>
+  <p:timing>
+    <p:tnLst>
+      <p:par>
+        <p:cTn id="1" dur="indefinite" restart="never" nodeType="tmRoot"/>
+      </p:par>
+    </p:tnLst>
+  </p:timing>
 </p:sld>
 </file>
 
@@ -11495,6 +12332,13 @@
   <p:clrMapOvr>
     <a:masterClrMapping/>
   </p:clrMapOvr>
+  <p:timing>
+    <p:tnLst>
+      <p:par>
+        <p:cTn id="1" dur="indefinite" restart="never" nodeType="tmRoot"/>
+      </p:par>
+    </p:tnLst>
+  </p:timing>
 </p:sld>
 </file>
 
@@ -11644,6 +12488,13 @@
   <p:clrMapOvr>
     <a:masterClrMapping/>
   </p:clrMapOvr>
+  <p:timing>
+    <p:tnLst>
+      <p:par>
+        <p:cTn id="1" dur="indefinite" restart="never" nodeType="tmRoot"/>
+      </p:par>
+    </p:tnLst>
+  </p:timing>
 </p:sld>
 </file>
 

</xml_diff>